<commit_message>
Revised Nox project logo and added transparent versions for white and non-white document themes/backgrounds. Cleaned up Nox overview graphic.
</commit_message>
<xml_diff>
--- a/docs/images/nox-overview.pptx
+++ b/docs/images/nox-overview.pptx
@@ -5,7 +5,7 @@
     <p:sldMasterId id="2147483648" r:id="rId1"/>
   </p:sldMasterIdLst>
   <p:sldIdLst>
-    <p:sldId id="256" r:id="rId2"/>
+    <p:sldId id="259" r:id="rId2"/>
     <p:sldId id="257" r:id="rId3"/>
   </p:sldIdLst>
   <p:sldSz cx="12192000" cy="6858000"/>
@@ -105,6 +105,11 @@
       </a:defRPr>
     </a:lvl9pPr>
   </p:defaultTextStyle>
+  <p:extLst>
+    <p:ext uri="{EFAFB233-063F-42B5-8137-9DF3F51BA10A}">
+      <p15:sldGuideLst xmlns:p15="http://schemas.microsoft.com/office/powerpoint/2012/main"/>
+    </p:ext>
+  </p:extLst>
 </p:presentation>
 </file>
 
@@ -257,7 +262,7 @@
           <a:p>
             <a:fld id="{AB953A02-B74D-4E39-A7FF-687D50FB8558}" type="datetimeFigureOut">
               <a:rPr lang="en-GB" smtClean="0"/>
-              <a:t>14/12/2022</a:t>
+              <a:t>21/01/2023</a:t>
             </a:fld>
             <a:endParaRPr lang="en-GB"/>
           </a:p>
@@ -457,7 +462,7 @@
           <a:p>
             <a:fld id="{AB953A02-B74D-4E39-A7FF-687D50FB8558}" type="datetimeFigureOut">
               <a:rPr lang="en-GB" smtClean="0"/>
-              <a:t>14/12/2022</a:t>
+              <a:t>21/01/2023</a:t>
             </a:fld>
             <a:endParaRPr lang="en-GB"/>
           </a:p>
@@ -667,7 +672,7 @@
           <a:p>
             <a:fld id="{AB953A02-B74D-4E39-A7FF-687D50FB8558}" type="datetimeFigureOut">
               <a:rPr lang="en-GB" smtClean="0"/>
-              <a:t>14/12/2022</a:t>
+              <a:t>21/01/2023</a:t>
             </a:fld>
             <a:endParaRPr lang="en-GB"/>
           </a:p>
@@ -867,7 +872,7 @@
           <a:p>
             <a:fld id="{AB953A02-B74D-4E39-A7FF-687D50FB8558}" type="datetimeFigureOut">
               <a:rPr lang="en-GB" smtClean="0"/>
-              <a:t>14/12/2022</a:t>
+              <a:t>21/01/2023</a:t>
             </a:fld>
             <a:endParaRPr lang="en-GB"/>
           </a:p>
@@ -1143,7 +1148,7 @@
           <a:p>
             <a:fld id="{AB953A02-B74D-4E39-A7FF-687D50FB8558}" type="datetimeFigureOut">
               <a:rPr lang="en-GB" smtClean="0"/>
-              <a:t>14/12/2022</a:t>
+              <a:t>21/01/2023</a:t>
             </a:fld>
             <a:endParaRPr lang="en-GB"/>
           </a:p>
@@ -1411,7 +1416,7 @@
           <a:p>
             <a:fld id="{AB953A02-B74D-4E39-A7FF-687D50FB8558}" type="datetimeFigureOut">
               <a:rPr lang="en-GB" smtClean="0"/>
-              <a:t>14/12/2022</a:t>
+              <a:t>21/01/2023</a:t>
             </a:fld>
             <a:endParaRPr lang="en-GB"/>
           </a:p>
@@ -1826,7 +1831,7 @@
           <a:p>
             <a:fld id="{AB953A02-B74D-4E39-A7FF-687D50FB8558}" type="datetimeFigureOut">
               <a:rPr lang="en-GB" smtClean="0"/>
-              <a:t>14/12/2022</a:t>
+              <a:t>21/01/2023</a:t>
             </a:fld>
             <a:endParaRPr lang="en-GB"/>
           </a:p>
@@ -1968,7 +1973,7 @@
           <a:p>
             <a:fld id="{AB953A02-B74D-4E39-A7FF-687D50FB8558}" type="datetimeFigureOut">
               <a:rPr lang="en-GB" smtClean="0"/>
-              <a:t>14/12/2022</a:t>
+              <a:t>21/01/2023</a:t>
             </a:fld>
             <a:endParaRPr lang="en-GB"/>
           </a:p>
@@ -2081,7 +2086,7 @@
           <a:p>
             <a:fld id="{AB953A02-B74D-4E39-A7FF-687D50FB8558}" type="datetimeFigureOut">
               <a:rPr lang="en-GB" smtClean="0"/>
-              <a:t>14/12/2022</a:t>
+              <a:t>21/01/2023</a:t>
             </a:fld>
             <a:endParaRPr lang="en-GB"/>
           </a:p>
@@ -2394,7 +2399,7 @@
           <a:p>
             <a:fld id="{AB953A02-B74D-4E39-A7FF-687D50FB8558}" type="datetimeFigureOut">
               <a:rPr lang="en-GB" smtClean="0"/>
-              <a:t>14/12/2022</a:t>
+              <a:t>21/01/2023</a:t>
             </a:fld>
             <a:endParaRPr lang="en-GB"/>
           </a:p>
@@ -2683,7 +2688,7 @@
           <a:p>
             <a:fld id="{AB953A02-B74D-4E39-A7FF-687D50FB8558}" type="datetimeFigureOut">
               <a:rPr lang="en-GB" smtClean="0"/>
-              <a:t>14/12/2022</a:t>
+              <a:t>21/01/2023</a:t>
             </a:fld>
             <a:endParaRPr lang="en-GB"/>
           </a:p>
@@ -2926,7 +2931,7 @@
           <a:p>
             <a:fld id="{AB953A02-B74D-4E39-A7FF-687D50FB8558}" type="datetimeFigureOut">
               <a:rPr lang="en-GB" smtClean="0"/>
-              <a:t>14/12/2022</a:t>
+              <a:t>21/01/2023</a:t>
             </a:fld>
             <a:endParaRPr lang="en-GB"/>
           </a:p>
@@ -3354,240 +3359,46 @@
           <a:chExt cx="0" cy="0"/>
         </a:xfrm>
       </p:grpSpPr>
-      <p:grpSp>
-        <p:nvGrpSpPr>
-          <p:cNvPr id="63" name="Group 62">
-            <a:extLst>
-              <a:ext uri="{FF2B5EF4-FFF2-40B4-BE49-F238E27FC236}">
-                <a16:creationId xmlns:a16="http://schemas.microsoft.com/office/drawing/2014/main" id="{CB573A2B-D7C7-44E3-A4AD-C3F1F69A8CB5}"/>
-              </a:ext>
-            </a:extLst>
-          </p:cNvPr>
-          <p:cNvGrpSpPr/>
+      <p:pic>
+        <p:nvPicPr>
+          <p:cNvPr id="3" name="Picture 2" descr="A picture containing text, vector graphics, sign, clipart&#10;&#10;Description automatically generated">
+            <a:extLst>
+              <a:ext uri="{FF2B5EF4-FFF2-40B4-BE49-F238E27FC236}">
+                <a16:creationId xmlns:a16="http://schemas.microsoft.com/office/drawing/2014/main" id="{C44AA9F7-F528-43BD-B495-94D2E2B91215}"/>
+              </a:ext>
+            </a:extLst>
+          </p:cNvPr>
+          <p:cNvPicPr>
+            <a:picLocks noChangeAspect="1"/>
+          </p:cNvPicPr>
           <p:nvPr/>
-        </p:nvGrpSpPr>
-        <p:grpSpPr>
+        </p:nvPicPr>
+        <p:blipFill>
+          <a:blip r:embed="rId2">
+            <a:extLst>
+              <a:ext uri="{28A0092B-C50C-407E-A947-70E740481C1C}">
+                <a14:useLocalDpi xmlns:a14="http://schemas.microsoft.com/office/drawing/2010/main" val="0"/>
+              </a:ext>
+            </a:extLst>
+          </a:blip>
+          <a:stretch>
+            <a:fillRect/>
+          </a:stretch>
+        </p:blipFill>
+        <p:spPr>
           <a:xfrm>
-            <a:off x="4177240" y="875407"/>
-            <a:ext cx="3837520" cy="5107187"/>
-            <a:chOff x="4454443" y="875407"/>
-            <a:chExt cx="3837520" cy="5107187"/>
+            <a:off x="4321409" y="854041"/>
+            <a:ext cx="3546628" cy="5140833"/>
           </a:xfrm>
-        </p:grpSpPr>
-        <p:pic>
-          <p:nvPicPr>
-            <p:cNvPr id="56" name="Picture 55" descr="Icon&#10;&#10;Description automatically generated">
-              <a:extLst>
-                <a:ext uri="{FF2B5EF4-FFF2-40B4-BE49-F238E27FC236}">
-                  <a16:creationId xmlns:a16="http://schemas.microsoft.com/office/drawing/2014/main" id="{0CFE3176-2A6D-4E71-947A-C5259E3B7DA7}"/>
-                </a:ext>
-              </a:extLst>
-            </p:cNvPr>
-            <p:cNvPicPr>
-              <a:picLocks noChangeAspect="1"/>
-            </p:cNvPicPr>
-            <p:nvPr/>
-          </p:nvPicPr>
-          <p:blipFill>
-            <a:blip r:embed="rId2">
-              <a:extLst>
-                <a:ext uri="{28A0092B-C50C-407E-A947-70E740481C1C}">
-                  <a14:useLocalDpi xmlns:a14="http://schemas.microsoft.com/office/drawing/2010/main" val="0"/>
-                </a:ext>
-              </a:extLst>
-            </a:blip>
-            <a:stretch>
-              <a:fillRect/>
-            </a:stretch>
-          </p:blipFill>
-          <p:spPr>
-            <a:xfrm>
-              <a:off x="4890560" y="980268"/>
-              <a:ext cx="2962732" cy="2962733"/>
-            </a:xfrm>
-            <a:prstGeom prst="rect">
-              <a:avLst/>
-            </a:prstGeom>
-          </p:spPr>
-        </p:pic>
-        <p:sp>
-          <p:nvSpPr>
-            <p:cNvPr id="57" name="Rectangle 56">
-              <a:extLst>
-                <a:ext uri="{FF2B5EF4-FFF2-40B4-BE49-F238E27FC236}">
-                  <a16:creationId xmlns:a16="http://schemas.microsoft.com/office/drawing/2014/main" id="{10A5DA81-7DCB-42F0-9AB6-7D0BE8FDA39F}"/>
-                </a:ext>
-              </a:extLst>
-            </p:cNvPr>
-            <p:cNvSpPr/>
-            <p:nvPr/>
-          </p:nvSpPr>
-          <p:spPr>
-            <a:xfrm>
-              <a:off x="4454443" y="4472879"/>
-              <a:ext cx="3834966" cy="1335015"/>
-            </a:xfrm>
-            <a:prstGeom prst="rect">
-              <a:avLst/>
-            </a:prstGeom>
-            <a:noFill/>
-            <a:ln>
-              <a:noFill/>
-            </a:ln>
-          </p:spPr>
-          <p:style>
-            <a:lnRef idx="2">
-              <a:schemeClr val="accent1">
-                <a:shade val="50000"/>
-              </a:schemeClr>
-            </a:lnRef>
-            <a:fillRef idx="1">
-              <a:schemeClr val="accent1"/>
-            </a:fillRef>
-            <a:effectRef idx="0">
-              <a:schemeClr val="accent1"/>
-            </a:effectRef>
-            <a:fontRef idx="minor">
-              <a:schemeClr val="lt1"/>
-            </a:fontRef>
-          </p:style>
-          <p:txBody>
-            <a:bodyPr rtlCol="0" anchor="ctr"/>
-            <a:lstStyle/>
-            <a:p>
-              <a:pPr algn="ctr"/>
-              <a:r>
-                <a:rPr lang="en-GB" sz="7200" spc="600" dirty="0">
-                  <a:latin typeface="Bierstadt" panose="020B0004020202020204" pitchFamily="34" charset="0"/>
-                </a:rPr>
-                <a:t>NOX</a:t>
-              </a:r>
-            </a:p>
-          </p:txBody>
-        </p:sp>
-        <p:grpSp>
-          <p:nvGrpSpPr>
-            <p:cNvPr id="62" name="Group 61">
-              <a:extLst>
-                <a:ext uri="{FF2B5EF4-FFF2-40B4-BE49-F238E27FC236}">
-                  <a16:creationId xmlns:a16="http://schemas.microsoft.com/office/drawing/2014/main" id="{EE7ECF1F-37C5-456C-B91E-CD861FCC647A}"/>
-                </a:ext>
-              </a:extLst>
-            </p:cNvPr>
-            <p:cNvGrpSpPr/>
-            <p:nvPr/>
-          </p:nvGrpSpPr>
-          <p:grpSpPr>
-            <a:xfrm>
-              <a:off x="4454769" y="875407"/>
-              <a:ext cx="3837194" cy="5107187"/>
-              <a:chOff x="3900037" y="875407"/>
-              <a:chExt cx="4391926" cy="5107187"/>
-            </a:xfrm>
-          </p:grpSpPr>
-          <p:sp>
-            <p:nvSpPr>
-              <p:cNvPr id="58" name="Rectangle 57">
-                <a:extLst>
-                  <a:ext uri="{FF2B5EF4-FFF2-40B4-BE49-F238E27FC236}">
-                    <a16:creationId xmlns:a16="http://schemas.microsoft.com/office/drawing/2014/main" id="{6BFC18EE-45D2-4FD9-9E71-A02A2F28BE1F}"/>
-                  </a:ext>
-                </a:extLst>
-              </p:cNvPr>
-              <p:cNvSpPr/>
-              <p:nvPr/>
-            </p:nvSpPr>
-            <p:spPr>
-              <a:xfrm>
-                <a:off x="3902588" y="875407"/>
-                <a:ext cx="4389375" cy="5107187"/>
-              </a:xfrm>
-              <a:prstGeom prst="rect">
-                <a:avLst/>
-              </a:prstGeom>
-              <a:noFill/>
-              <a:ln w="50800">
-                <a:solidFill>
-                  <a:srgbClr val="DD342E">
-                    <a:alpha val="78000"/>
-                  </a:srgbClr>
-                </a:solidFill>
-              </a:ln>
-            </p:spPr>
-            <p:style>
-              <a:lnRef idx="2">
-                <a:schemeClr val="accent1">
-                  <a:shade val="50000"/>
-                </a:schemeClr>
-              </a:lnRef>
-              <a:fillRef idx="1">
-                <a:schemeClr val="accent1"/>
-              </a:fillRef>
-              <a:effectRef idx="0">
-                <a:schemeClr val="accent1"/>
-              </a:effectRef>
-              <a:fontRef idx="minor">
-                <a:schemeClr val="lt1"/>
-              </a:fontRef>
-            </p:style>
-            <p:txBody>
-              <a:bodyPr rtlCol="0" anchor="ctr"/>
-              <a:lstStyle/>
-              <a:p>
-                <a:pPr algn="ctr"/>
-                <a:endParaRPr lang="en-GB"/>
-              </a:p>
-            </p:txBody>
-          </p:sp>
-          <p:cxnSp>
-            <p:nvCxnSpPr>
-              <p:cNvPr id="60" name="Straight Connector 59">
-                <a:extLst>
-                  <a:ext uri="{FF2B5EF4-FFF2-40B4-BE49-F238E27FC236}">
-                    <a16:creationId xmlns:a16="http://schemas.microsoft.com/office/drawing/2014/main" id="{58701929-BC2E-4003-9AF4-17383F1A9A30}"/>
-                  </a:ext>
-                </a:extLst>
-              </p:cNvPr>
-              <p:cNvCxnSpPr/>
-              <p:nvPr/>
-            </p:nvCxnSpPr>
-            <p:spPr>
-              <a:xfrm>
-                <a:off x="3900037" y="4298179"/>
-                <a:ext cx="4389372" cy="0"/>
-              </a:xfrm>
-              <a:prstGeom prst="line">
-                <a:avLst/>
-              </a:prstGeom>
-              <a:ln w="25400">
-                <a:solidFill>
-                  <a:srgbClr val="DD342E">
-                    <a:alpha val="78000"/>
-                  </a:srgbClr>
-                </a:solidFill>
-              </a:ln>
-            </p:spPr>
-            <p:style>
-              <a:lnRef idx="1">
-                <a:schemeClr val="accent1"/>
-              </a:lnRef>
-              <a:fillRef idx="0">
-                <a:schemeClr val="accent1"/>
-              </a:fillRef>
-              <a:effectRef idx="0">
-                <a:schemeClr val="accent1"/>
-              </a:effectRef>
-              <a:fontRef idx="minor">
-                <a:schemeClr val="tx1"/>
-              </a:fontRef>
-            </p:style>
-          </p:cxnSp>
-        </p:grpSp>
-      </p:grpSp>
+          <a:prstGeom prst="rect">
+            <a:avLst/>
+          </a:prstGeom>
+        </p:spPr>
+      </p:pic>
     </p:spTree>
     <p:extLst>
       <p:ext uri="{BB962C8B-B14F-4D97-AF65-F5344CB8AC3E}">
-        <p14:creationId xmlns:p14="http://schemas.microsoft.com/office/powerpoint/2010/main" val="453602471"/>
+        <p14:creationId xmlns:p14="http://schemas.microsoft.com/office/powerpoint/2010/main" val="2398185337"/>
       </p:ext>
     </p:extLst>
   </p:cSld>
@@ -3965,16 +3776,6 @@
           <a:p>
             <a:pPr algn="ctr"/>
             <a:r>
-              <a:rPr lang="en-US" sz="1200" dirty="0" err="1">
-                <a:solidFill>
-                  <a:schemeClr val="bg1">
-                    <a:lumMod val="75000"/>
-                  </a:schemeClr>
-                </a:solidFill>
-              </a:rPr>
-              <a:t>Nox</a:t>
-            </a:r>
-            <a:r>
               <a:rPr lang="en-US" sz="1200" dirty="0">
                 <a:solidFill>
                   <a:schemeClr val="bg1">
@@ -3982,7 +3783,7 @@
                   </a:schemeClr>
                 </a:solidFill>
               </a:rPr>
-              <a:t> generates strong types for you in your IDE</a:t>
+              <a:t>Nox generates strong types for you in your IDE</a:t>
             </a:r>
           </a:p>
           <a:p>
@@ -4887,7 +4688,7 @@
                 </a:solidFill>
                 <a:latin typeface="Bierstadt" panose="020B0604020202020204" pitchFamily="34" charset="0"/>
               </a:rPr>
-              <a:t>ODATA/REST</a:t>
+              <a:t>OData/REST</a:t>
             </a:r>
             <a:endParaRPr lang="en-GB" sz="1000" dirty="0">
               <a:solidFill>
@@ -4954,7 +4755,7 @@
           <a:p>
             <a:pPr algn="ctr"/>
             <a:r>
-              <a:rPr lang="en-US" sz="1000" dirty="0" err="1">
+              <a:rPr lang="en-US" sz="1000" dirty="0">
                 <a:solidFill>
                   <a:schemeClr val="bg1">
                     <a:lumMod val="75000"/>
@@ -5029,7 +4830,7 @@
           <a:p>
             <a:pPr algn="ctr"/>
             <a:r>
-              <a:rPr lang="en-US" sz="1000" dirty="0" err="1">
+              <a:rPr lang="en-US" sz="1000" dirty="0">
                 <a:solidFill>
                   <a:schemeClr val="bg1">
                     <a:lumMod val="75000"/>
@@ -6086,17 +5887,6 @@
               <a:defRPr/>
             </a:pPr>
             <a:r>
-              <a:rPr lang="en-US" sz="1000" dirty="0" err="1">
-                <a:solidFill>
-                  <a:schemeClr val="bg1">
-                    <a:lumMod val="75000"/>
-                  </a:schemeClr>
-                </a:solidFill>
-                <a:latin typeface="Calibri" panose="020F0502020204030204"/>
-              </a:rPr>
-              <a:t>Sql</a:t>
-            </a:r>
-            <a:r>
               <a:rPr lang="en-US" sz="1000" dirty="0">
                 <a:solidFill>
                   <a:schemeClr val="bg1">
@@ -6105,7 +5895,7 @@
                 </a:solidFill>
                 <a:latin typeface="Calibri" panose="020F0502020204030204"/>
               </a:rPr>
-              <a:t> Server</a:t>
+              <a:t>SQL Server</a:t>
             </a:r>
           </a:p>
           <a:p>
@@ -6116,7 +5906,7 @@
               <a:defRPr/>
             </a:pPr>
             <a:r>
-              <a:rPr kumimoji="0" lang="en-US" sz="1000" b="0" i="0" u="none" strike="noStrike" kern="1200" cap="none" spc="0" normalizeH="0" baseline="0" noProof="0" dirty="0" err="1">
+              <a:rPr kumimoji="0" lang="en-US" sz="1000" b="0" i="0" u="none" strike="noStrike" kern="1200" cap="none" spc="0" normalizeH="0" baseline="0" noProof="0" dirty="0">
                 <a:ln>
                   <a:noFill/>
                 </a:ln>
@@ -6132,24 +5922,8 @@
                 <a:ea typeface="+mn-ea"/>
                 <a:cs typeface="+mn-cs"/>
               </a:rPr>
-              <a:t>Postgress</a:t>
-            </a:r>
-            <a:endParaRPr kumimoji="0" lang="en-US" sz="1000" b="0" i="0" u="none" strike="noStrike" kern="1200" cap="none" spc="0" normalizeH="0" baseline="0" noProof="0" dirty="0">
-              <a:ln>
-                <a:noFill/>
-              </a:ln>
-              <a:solidFill>
-                <a:schemeClr val="bg1">
-                  <a:lumMod val="75000"/>
-                </a:schemeClr>
-              </a:solidFill>
-              <a:effectLst/>
-              <a:uLnTx/>
-              <a:uFillTx/>
-              <a:latin typeface="Calibri" panose="020F0502020204030204"/>
-              <a:ea typeface="+mn-ea"/>
-              <a:cs typeface="+mn-cs"/>
-            </a:endParaRPr>
+              <a:t>PostgreSQL</a:t>
+            </a:r>
           </a:p>
           <a:p>
             <a:pPr marL="179388" lvl="1" indent="-93663" defTabSz="900113">
@@ -6325,25 +6099,6 @@
               <a:defRPr/>
             </a:pPr>
             <a:r>
-              <a:rPr kumimoji="0" lang="en-US" sz="1000" b="0" i="0" u="none" strike="noStrike" kern="1200" cap="none" spc="0" normalizeH="0" baseline="0" noProof="0" dirty="0" err="1">
-                <a:ln>
-                  <a:noFill/>
-                </a:ln>
-                <a:solidFill>
-                  <a:schemeClr val="bg1">
-                    <a:lumMod val="75000"/>
-                  </a:schemeClr>
-                </a:solidFill>
-                <a:effectLst/>
-                <a:uLnTx/>
-                <a:uFillTx/>
-                <a:latin typeface="Calibri" panose="020F0502020204030204"/>
-                <a:ea typeface="+mn-ea"/>
-                <a:cs typeface="+mn-cs"/>
-              </a:rPr>
-              <a:t>Sql</a:t>
-            </a:r>
-            <a:r>
               <a:rPr kumimoji="0" lang="en-US" sz="1000" b="0" i="0" u="none" strike="noStrike" kern="1200" cap="none" spc="0" normalizeH="0" baseline="0" noProof="0" dirty="0">
                 <a:ln>
                   <a:noFill/>
@@ -6360,7 +6115,7 @@
                 <a:ea typeface="+mn-ea"/>
                 <a:cs typeface="+mn-cs"/>
               </a:rPr>
-              <a:t> Server</a:t>
+              <a:t>SQL Server</a:t>
             </a:r>
           </a:p>
           <a:p>
@@ -6371,7 +6126,7 @@
               <a:defRPr/>
             </a:pPr>
             <a:r>
-              <a:rPr lang="en-US" sz="1000" dirty="0" err="1">
+              <a:rPr lang="en-US" sz="1000" dirty="0">
                 <a:solidFill>
                   <a:schemeClr val="bg1">
                     <a:lumMod val="75000"/>
@@ -6379,16 +6134,8 @@
                 </a:solidFill>
                 <a:latin typeface="Calibri" panose="020F0502020204030204"/>
               </a:rPr>
-              <a:t>Postgress</a:t>
-            </a:r>
-            <a:endParaRPr lang="en-US" sz="1000" dirty="0">
-              <a:solidFill>
-                <a:schemeClr val="bg1">
-                  <a:lumMod val="75000"/>
-                </a:schemeClr>
-              </a:solidFill>
-              <a:latin typeface="Calibri" panose="020F0502020204030204"/>
-            </a:endParaRPr>
+              <a:t>PostgreSQL</a:t>
+            </a:r>
           </a:p>
           <a:p>
             <a:pPr marL="179388" lvl="1" indent="-93663">
@@ -6466,7 +6213,7 @@
               <a:t>Excel/</a:t>
             </a:r>
             <a:r>
-              <a:rPr lang="en-US" sz="1000" dirty="0" err="1">
+              <a:rPr lang="en-US" sz="1000" dirty="0">
                 <a:solidFill>
                   <a:schemeClr val="bg1">
                     <a:lumMod val="75000"/>
@@ -6474,16 +6221,8 @@
                 </a:solidFill>
                 <a:latin typeface="Calibri" panose="020F0502020204030204"/>
               </a:rPr>
-              <a:t>Json</a:t>
-            </a:r>
-            <a:endParaRPr lang="en-US" sz="1000" dirty="0">
-              <a:solidFill>
-                <a:schemeClr val="bg1">
-                  <a:lumMod val="75000"/>
-                </a:schemeClr>
-              </a:solidFill>
-              <a:latin typeface="Calibri" panose="020F0502020204030204"/>
-            </a:endParaRPr>
+              <a:t>JSON</a:t>
+            </a:r>
           </a:p>
           <a:p>
             <a:pPr marL="179388" lvl="1" indent="-93663">
@@ -7555,43 +7294,8 @@
                 <a:ea typeface="+mn-ea"/>
                 <a:cs typeface="+mn-cs"/>
               </a:rPr>
-              <a:t>CRUD </a:t>
-            </a:r>
-            <a:r>
-              <a:rPr kumimoji="0" lang="en-US" sz="1000" b="0" i="0" u="none" strike="noStrike" kern="1200" cap="none" spc="0" normalizeH="0" baseline="0" noProof="0" dirty="0" err="1">
-                <a:ln>
-                  <a:noFill/>
-                </a:ln>
-                <a:solidFill>
-                  <a:schemeClr val="bg1">
-                    <a:lumMod val="75000"/>
-                  </a:schemeClr>
-                </a:solidFill>
-                <a:effectLst/>
-                <a:uLnTx/>
-                <a:uFillTx/>
-                <a:latin typeface="Calibri" panose="020F0502020204030204"/>
-                <a:ea typeface="+mn-ea"/>
-                <a:cs typeface="+mn-cs"/>
-              </a:rPr>
-              <a:t>Api</a:t>
-            </a:r>
-            <a:endParaRPr kumimoji="0" lang="en-US" sz="1000" b="0" i="0" u="none" strike="noStrike" kern="1200" cap="none" spc="0" normalizeH="0" baseline="0" noProof="0" dirty="0">
-              <a:ln>
-                <a:noFill/>
-              </a:ln>
-              <a:solidFill>
-                <a:schemeClr val="bg1">
-                  <a:lumMod val="75000"/>
-                </a:schemeClr>
-              </a:solidFill>
-              <a:effectLst/>
-              <a:uLnTx/>
-              <a:uFillTx/>
-              <a:latin typeface="Calibri" panose="020F0502020204030204"/>
-              <a:ea typeface="+mn-ea"/>
-              <a:cs typeface="+mn-cs"/>
-            </a:endParaRPr>
+              <a:t>CRUD API</a:t>
+            </a:r>
           </a:p>
           <a:p>
             <a:pPr marL="85725" marR="0" lvl="0" indent="-85725" algn="l" defTabSz="914400" rtl="0" eaLnBrk="1" fontAlgn="auto" latinLnBrk="0" hangingPunct="1">
@@ -7710,7 +7414,7 @@
               <a:defRPr/>
             </a:pPr>
             <a:r>
-              <a:rPr lang="en-US" sz="1000" dirty="0" err="1">
+              <a:rPr lang="en-US" sz="1000" dirty="0">
                 <a:solidFill>
                   <a:schemeClr val="bg1">
                     <a:lumMod val="75000"/>
@@ -7720,14 +7424,6 @@
               </a:rPr>
               <a:t>gRPC</a:t>
             </a:r>
-            <a:endParaRPr lang="en-US" sz="1000" dirty="0">
-              <a:solidFill>
-                <a:schemeClr val="bg1">
-                  <a:lumMod val="75000"/>
-                </a:schemeClr>
-              </a:solidFill>
-              <a:latin typeface="Calibri" panose="020F0502020204030204"/>
-            </a:endParaRPr>
           </a:p>
           <a:p>
             <a:pPr marL="179388" lvl="1" indent="-93663">
@@ -7737,7 +7433,7 @@
               <a:defRPr/>
             </a:pPr>
             <a:r>
-              <a:rPr lang="en-US" sz="1000" dirty="0" err="1">
+              <a:rPr lang="en-US" sz="1000" dirty="0">
                 <a:solidFill>
                   <a:schemeClr val="bg1">
                     <a:lumMod val="75000"/>
@@ -7745,16 +7441,8 @@
                 </a:solidFill>
                 <a:latin typeface="Calibri" panose="020F0502020204030204"/>
               </a:rPr>
-              <a:t>GraphQl</a:t>
-            </a:r>
-            <a:endParaRPr lang="en-US" sz="1000" dirty="0">
-              <a:solidFill>
-                <a:schemeClr val="bg1">
-                  <a:lumMod val="75000"/>
-                </a:schemeClr>
-              </a:solidFill>
-              <a:latin typeface="Calibri" panose="020F0502020204030204"/>
-            </a:endParaRPr>
+              <a:t>GraphQL</a:t>
+            </a:r>
           </a:p>
           <a:p>
             <a:pPr marL="85725" marR="0" lvl="0" indent="-85725" algn="l" defTabSz="914400" rtl="0" eaLnBrk="1" fontAlgn="auto" latinLnBrk="0" hangingPunct="1">
@@ -8095,7 +7783,7 @@
           <a:p>
             <a:pPr algn="ctr"/>
             <a:r>
-              <a:rPr lang="en-GB" sz="1000" spc="40" dirty="0" err="1">
+              <a:rPr lang="en-GB" sz="1000" spc="40" dirty="0">
                 <a:solidFill>
                   <a:srgbClr val="AA72D4"/>
                 </a:solidFill>
@@ -8103,12 +7791,6 @@
               </a:rPr>
               <a:t>ETLBox</a:t>
             </a:r>
-            <a:endParaRPr lang="en-GB" sz="1000" spc="40" dirty="0">
-              <a:solidFill>
-                <a:srgbClr val="AA72D4"/>
-              </a:solidFill>
-              <a:latin typeface="Bierstadt" panose="020B0004020202020204" pitchFamily="34" charset="0"/>
-            </a:endParaRPr>
           </a:p>
         </p:txBody>
       </p:sp>
@@ -8168,7 +7850,7 @@
           <a:p>
             <a:pPr algn="ctr"/>
             <a:r>
-              <a:rPr lang="en-GB" sz="1000" spc="40" dirty="0" err="1">
+              <a:rPr lang="en-GB" sz="1000" spc="40" dirty="0">
                 <a:solidFill>
                   <a:srgbClr val="AA72D4"/>
                 </a:solidFill>
@@ -8176,12 +7858,6 @@
               </a:rPr>
               <a:t>SqlKata</a:t>
             </a:r>
-            <a:endParaRPr lang="en-GB" sz="1000" spc="40" dirty="0">
-              <a:solidFill>
-                <a:srgbClr val="AA72D4"/>
-              </a:solidFill>
-              <a:latin typeface="Bierstadt" panose="020B0004020202020204" pitchFamily="34" charset="0"/>
-            </a:endParaRPr>
           </a:p>
         </p:txBody>
       </p:sp>
@@ -8381,7 +8057,7 @@
           <a:p>
             <a:pPr algn="ctr"/>
             <a:r>
-              <a:rPr lang="en-GB" sz="1000" spc="40" dirty="0" err="1">
+              <a:rPr lang="en-GB" sz="1000" spc="40" dirty="0">
                 <a:solidFill>
                   <a:srgbClr val="AA72D4"/>
                 </a:solidFill>
@@ -8389,12 +8065,6 @@
               </a:rPr>
               <a:t>MassTransit</a:t>
             </a:r>
-            <a:endParaRPr lang="en-GB" sz="1000" spc="40" dirty="0">
-              <a:solidFill>
-                <a:srgbClr val="AA72D4"/>
-              </a:solidFill>
-              <a:latin typeface="Bierstadt" panose="020B0004020202020204" pitchFamily="34" charset="0"/>
-            </a:endParaRPr>
           </a:p>
         </p:txBody>
       </p:sp>
@@ -8454,7 +8124,7 @@
           <a:p>
             <a:pPr algn="ctr"/>
             <a:r>
-              <a:rPr lang="en-GB" sz="1000" spc="40" dirty="0" err="1">
+              <a:rPr lang="en-GB" sz="1000" spc="40" dirty="0">
                 <a:solidFill>
                   <a:srgbClr val="AA72D4"/>
                 </a:solidFill>
@@ -8462,12 +8132,6 @@
               </a:rPr>
               <a:t>Hangfire</a:t>
             </a:r>
-            <a:endParaRPr lang="en-GB" sz="1000" spc="40" dirty="0">
-              <a:solidFill>
-                <a:srgbClr val="AA72D4"/>
-              </a:solidFill>
-              <a:latin typeface="Bierstadt" panose="020B0004020202020204" pitchFamily="34" charset="0"/>
-            </a:endParaRPr>
           </a:p>
         </p:txBody>
       </p:sp>
@@ -8527,7 +8191,7 @@
           <a:p>
             <a:pPr algn="ctr"/>
             <a:r>
-              <a:rPr lang="en-GB" sz="1000" spc="40" dirty="0" err="1">
+              <a:rPr lang="en-GB" sz="1000" spc="40" dirty="0">
                 <a:solidFill>
                   <a:srgbClr val="AA72D4"/>
                 </a:solidFill>
@@ -8535,12 +8199,6 @@
               </a:rPr>
               <a:t>Serilog</a:t>
             </a:r>
-            <a:endParaRPr lang="en-GB" sz="1000" spc="40" dirty="0">
-              <a:solidFill>
-                <a:srgbClr val="AA72D4"/>
-              </a:solidFill>
-              <a:latin typeface="Bierstadt" panose="020B0004020202020204" pitchFamily="34" charset="0"/>
-            </a:endParaRPr>
           </a:p>
         </p:txBody>
       </p:sp>
@@ -8600,7 +8258,7 @@
           <a:p>
             <a:pPr algn="ctr"/>
             <a:r>
-              <a:rPr lang="en-GB" sz="1000" spc="40" dirty="0" err="1">
+              <a:rPr lang="en-GB" sz="1000" spc="40" dirty="0">
                 <a:solidFill>
                   <a:srgbClr val="AA72D4"/>
                 </a:solidFill>
@@ -8608,12 +8266,6 @@
               </a:rPr>
               <a:t>AutoMapper</a:t>
             </a:r>
-            <a:endParaRPr lang="en-GB" sz="1000" spc="40" dirty="0">
-              <a:solidFill>
-                <a:srgbClr val="AA72D4"/>
-              </a:solidFill>
-              <a:latin typeface="Bierstadt" panose="020B0004020202020204" pitchFamily="34" charset="0"/>
-            </a:endParaRPr>
           </a:p>
         </p:txBody>
       </p:sp>
@@ -8673,7 +8325,7 @@
           <a:p>
             <a:pPr algn="ctr"/>
             <a:r>
-              <a:rPr lang="en-GB" sz="1000" spc="40" dirty="0" err="1">
+              <a:rPr lang="en-GB" sz="1000" spc="40" dirty="0">
                 <a:solidFill>
                   <a:srgbClr val="AA72D4"/>
                 </a:solidFill>
@@ -8681,12 +8333,6 @@
               </a:rPr>
               <a:t>FluentValidation</a:t>
             </a:r>
-            <a:endParaRPr lang="en-GB" sz="1000" spc="40" dirty="0">
-              <a:solidFill>
-                <a:srgbClr val="AA72D4"/>
-              </a:solidFill>
-              <a:latin typeface="Bierstadt" panose="020B0004020202020204" pitchFamily="34" charset="0"/>
-            </a:endParaRPr>
           </a:p>
         </p:txBody>
       </p:sp>
@@ -8746,7 +8392,7 @@
           <a:p>
             <a:pPr algn="ctr"/>
             <a:r>
-              <a:rPr lang="en-GB" sz="1000" spc="40" dirty="0" err="1">
+              <a:rPr lang="en-GB" sz="1000" spc="40" dirty="0">
                 <a:solidFill>
                   <a:srgbClr val="AA72D4"/>
                 </a:solidFill>
@@ -8754,12 +8400,6 @@
               </a:rPr>
               <a:t>YamlDotNet</a:t>
             </a:r>
-            <a:endParaRPr lang="en-GB" sz="1000" spc="40" dirty="0">
-              <a:solidFill>
-                <a:srgbClr val="AA72D4"/>
-              </a:solidFill>
-              <a:latin typeface="Bierstadt" panose="020B0004020202020204" pitchFamily="34" charset="0"/>
-            </a:endParaRPr>
           </a:p>
         </p:txBody>
       </p:sp>

</xml_diff>